<commit_message>
Added lecture 5 and demos
</commit_message>
<xml_diff>
--- a/03-Data-Types.pptx
+++ b/03-Data-Types.pptx
@@ -5,7 +5,7 @@
     <p:sldMasterId id="2147483648" r:id="rId1"/>
   </p:sldMasterIdLst>
   <p:notesMasterIdLst>
-    <p:notesMasterId r:id="rId26"/>
+    <p:notesMasterId r:id="rId25"/>
   </p:notesMasterIdLst>
   <p:sldIdLst>
     <p:sldId id="256" r:id="rId2"/>
@@ -18,20 +18,19 @@
     <p:sldId id="264" r:id="rId9"/>
     <p:sldId id="276" r:id="rId10"/>
     <p:sldId id="277" r:id="rId11"/>
-    <p:sldId id="263" r:id="rId12"/>
-    <p:sldId id="265" r:id="rId13"/>
-    <p:sldId id="266" r:id="rId14"/>
-    <p:sldId id="267" r:id="rId15"/>
-    <p:sldId id="278" r:id="rId16"/>
-    <p:sldId id="268" r:id="rId17"/>
+    <p:sldId id="278" r:id="rId12"/>
+    <p:sldId id="268" r:id="rId13"/>
+    <p:sldId id="263" r:id="rId14"/>
+    <p:sldId id="265" r:id="rId15"/>
+    <p:sldId id="266" r:id="rId16"/>
+    <p:sldId id="267" r:id="rId17"/>
     <p:sldId id="269" r:id="rId18"/>
     <p:sldId id="271" r:id="rId19"/>
-    <p:sldId id="279" r:id="rId20"/>
-    <p:sldId id="270" r:id="rId21"/>
-    <p:sldId id="272" r:id="rId22"/>
-    <p:sldId id="273" r:id="rId23"/>
-    <p:sldId id="274" r:id="rId24"/>
-    <p:sldId id="275" r:id="rId25"/>
+    <p:sldId id="270" r:id="rId20"/>
+    <p:sldId id="272" r:id="rId21"/>
+    <p:sldId id="273" r:id="rId22"/>
+    <p:sldId id="274" r:id="rId23"/>
+    <p:sldId id="275" r:id="rId24"/>
   </p:sldIdLst>
   <p:sldSz cx="9144000" cy="6858000" type="screen4x3"/>
   <p:notesSz cx="6858000" cy="9144000"/>
@@ -1426,6 +1425,367 @@
         </p:nvSpPr>
         <p:spPr>
           <a:xfrm>
+            <a:off x="609600" y="685800"/>
+            <a:ext cx="8229600" cy="1143000"/>
+          </a:xfrm>
+        </p:spPr>
+        <p:txBody>
+          <a:bodyPr/>
+          <a:lstStyle/>
+          <a:p>
+            <a:r>
+              <a:rPr lang="bg-BG" dirty="0" smtClean="0">
+                <a:solidFill>
+                  <a:schemeClr val="accent6"/>
+                </a:solidFill>
+              </a:rPr>
+              <a:t>Тип </a:t>
+            </a:r>
+            <a:r>
+              <a:rPr lang="en-US" dirty="0" smtClean="0">
+                <a:solidFill>
+                  <a:schemeClr val="accent6"/>
+                </a:solidFill>
+              </a:rPr>
+              <a:t>String</a:t>
+            </a:r>
+            <a:endParaRPr lang="bg-BG" dirty="0">
+              <a:solidFill>
+                <a:schemeClr val="accent6"/>
+              </a:solidFill>
+            </a:endParaRPr>
+          </a:p>
+        </p:txBody>
+      </p:sp>
+      <p:sp>
+        <p:nvSpPr>
+          <p:cNvPr id="3" name="Content Placeholder 2"/>
+          <p:cNvSpPr>
+            <a:spLocks noGrp="1"/>
+          </p:cNvSpPr>
+          <p:nvPr>
+            <p:ph idx="1"/>
+          </p:nvPr>
+        </p:nvSpPr>
+        <p:spPr>
+          <a:xfrm>
+            <a:off x="762000" y="1676400"/>
+            <a:ext cx="7924800" cy="4525963"/>
+          </a:xfrm>
+        </p:spPr>
+        <p:txBody>
+          <a:bodyPr/>
+          <a:lstStyle/>
+          <a:p>
+            <a:pPr>
+              <a:buFont typeface="Wingdings" panose="05000000000000000000" pitchFamily="2" charset="2"/>
+              <a:buChar char="§"/>
+            </a:pPr>
+            <a:r>
+              <a:rPr lang="bg-BG" dirty="0" smtClean="0">
+                <a:solidFill>
+                  <a:schemeClr val="bg1">
+                    <a:lumMod val="95000"/>
+                  </a:schemeClr>
+                </a:solidFill>
+              </a:rPr>
+              <a:t>Референтен тип</a:t>
+            </a:r>
+            <a:endParaRPr lang="en-US" dirty="0" smtClean="0">
+              <a:solidFill>
+                <a:schemeClr val="bg1">
+                  <a:lumMod val="95000"/>
+                </a:schemeClr>
+              </a:solidFill>
+            </a:endParaRPr>
+          </a:p>
+          <a:p>
+            <a:pPr>
+              <a:buFont typeface="Wingdings" panose="05000000000000000000" pitchFamily="2" charset="2"/>
+              <a:buChar char="§"/>
+            </a:pPr>
+            <a:r>
+              <a:rPr lang="bg-BG" dirty="0" smtClean="0">
+                <a:solidFill>
+                  <a:schemeClr val="bg1">
+                    <a:lumMod val="95000"/>
+                  </a:schemeClr>
+                </a:solidFill>
+              </a:rPr>
+              <a:t>Представя поредица от символи (текст)</a:t>
+            </a:r>
+            <a:endParaRPr lang="bg-BG" dirty="0">
+              <a:solidFill>
+                <a:schemeClr val="bg1">
+                  <a:lumMod val="95000"/>
+                </a:schemeClr>
+              </a:solidFill>
+            </a:endParaRPr>
+          </a:p>
+          <a:p>
+            <a:pPr>
+              <a:buFont typeface="Wingdings" panose="05000000000000000000" pitchFamily="2" charset="2"/>
+              <a:buChar char="§"/>
+            </a:pPr>
+            <a:r>
+              <a:rPr lang="bg-BG" dirty="0" smtClean="0">
+                <a:solidFill>
+                  <a:schemeClr val="bg1">
+                    <a:lumMod val="95000"/>
+                  </a:schemeClr>
+                </a:solidFill>
+              </a:rPr>
+              <a:t>Размерът на променливата се определя от броя символи</a:t>
+            </a:r>
+            <a:endParaRPr lang="bg-BG" dirty="0">
+              <a:solidFill>
+                <a:schemeClr val="bg1">
+                  <a:lumMod val="95000"/>
+                </a:schemeClr>
+              </a:solidFill>
+            </a:endParaRPr>
+          </a:p>
+          <a:p>
+            <a:pPr>
+              <a:buFont typeface="Wingdings" panose="05000000000000000000" pitchFamily="2" charset="2"/>
+              <a:buChar char="§"/>
+            </a:pPr>
+            <a:r>
+              <a:rPr lang="en-US" dirty="0" smtClean="0">
+                <a:solidFill>
+                  <a:schemeClr val="bg1">
+                    <a:lumMod val="95000"/>
+                  </a:schemeClr>
+                </a:solidFill>
+              </a:rPr>
+              <a:t>Default null</a:t>
+            </a:r>
+          </a:p>
+          <a:p>
+            <a:pPr>
+              <a:buFont typeface="Wingdings" panose="05000000000000000000" pitchFamily="2" charset="2"/>
+              <a:buChar char="§"/>
+            </a:pPr>
+            <a:r>
+              <a:rPr lang="bg-BG" dirty="0" smtClean="0">
+                <a:solidFill>
+                  <a:schemeClr val="bg1">
+                    <a:lumMod val="95000"/>
+                  </a:schemeClr>
+                </a:solidFill>
+              </a:rPr>
+              <a:t>Низовете (стрингове) могат да се долепят чрез конкатенация</a:t>
+            </a:r>
+            <a:r>
+              <a:rPr lang="en-US" dirty="0" smtClean="0">
+                <a:solidFill>
+                  <a:schemeClr val="bg1">
+                    <a:lumMod val="95000"/>
+                  </a:schemeClr>
+                </a:solidFill>
+              </a:rPr>
+              <a:t> (</a:t>
+            </a:r>
+            <a:r>
+              <a:rPr lang="bg-BG" dirty="0" smtClean="0">
+                <a:solidFill>
+                  <a:schemeClr val="bg1">
+                    <a:lumMod val="95000"/>
+                  </a:schemeClr>
+                </a:solidFill>
+              </a:rPr>
+              <a:t>оператор: +)</a:t>
+            </a:r>
+          </a:p>
+          <a:p>
+            <a:pPr>
+              <a:buFont typeface="Wingdings" panose="05000000000000000000" pitchFamily="2" charset="2"/>
+              <a:buChar char="§"/>
+            </a:pPr>
+            <a:endParaRPr lang="en-US" dirty="0">
+              <a:solidFill>
+                <a:schemeClr val="bg1">
+                  <a:lumMod val="95000"/>
+                </a:schemeClr>
+              </a:solidFill>
+            </a:endParaRPr>
+          </a:p>
+          <a:p>
+            <a:endParaRPr lang="en-US" dirty="0"/>
+          </a:p>
+        </p:txBody>
+      </p:sp>
+    </p:spTree>
+    <p:extLst>
+      <p:ext uri="{BB962C8B-B14F-4D97-AF65-F5344CB8AC3E}">
+        <p14:creationId xmlns:p14="http://schemas.microsoft.com/office/powerpoint/2010/main" val="1328150602"/>
+      </p:ext>
+    </p:extLst>
+  </p:cSld>
+  <p:clrMapOvr>
+    <a:masterClrMapping/>
+  </p:clrMapOvr>
+  <p:timing>
+    <p:tnLst>
+      <p:par>
+        <p:cTn id="1" dur="indefinite" restart="never" nodeType="tmRoot"/>
+      </p:par>
+    </p:tnLst>
+  </p:timing>
+</p:sld>
+</file>
+
+<file path=ppt/slides/slide12.xml><?xml version="1.0" encoding="utf-8"?>
+<p:sld xmlns:a="http://schemas.openxmlformats.org/drawingml/2006/main" xmlns:r="http://schemas.openxmlformats.org/officeDocument/2006/relationships" xmlns:p="http://schemas.openxmlformats.org/presentationml/2006/main">
+  <p:cSld>
+    <p:spTree>
+      <p:nvGrpSpPr>
+        <p:cNvPr id="1" name=""/>
+        <p:cNvGrpSpPr/>
+        <p:nvPr/>
+      </p:nvGrpSpPr>
+      <p:grpSpPr>
+        <a:xfrm>
+          <a:off x="0" y="0"/>
+          <a:ext cx="0" cy="0"/>
+          <a:chOff x="0" y="0"/>
+          <a:chExt cx="0" cy="0"/>
+        </a:xfrm>
+      </p:grpSpPr>
+      <p:sp>
+        <p:nvSpPr>
+          <p:cNvPr id="2" name="Title 1"/>
+          <p:cNvSpPr>
+            <a:spLocks noGrp="1"/>
+          </p:cNvSpPr>
+          <p:nvPr>
+            <p:ph type="title"/>
+          </p:nvPr>
+        </p:nvSpPr>
+        <p:spPr>
+          <a:xfrm>
+            <a:off x="388208" y="685800"/>
+            <a:ext cx="8229600" cy="1143000"/>
+          </a:xfrm>
+        </p:spPr>
+        <p:txBody>
+          <a:bodyPr/>
+          <a:lstStyle/>
+          <a:p>
+            <a:r>
+              <a:rPr lang="bg-BG" dirty="0" smtClean="0">
+                <a:solidFill>
+                  <a:schemeClr val="accent6"/>
+                </a:solidFill>
+              </a:rPr>
+              <a:t>Демонстрация на </a:t>
+            </a:r>
+            <a:r>
+              <a:rPr lang="en-US" dirty="0" smtClean="0">
+                <a:solidFill>
+                  <a:schemeClr val="accent6"/>
+                </a:solidFill>
+              </a:rPr>
+              <a:t>String</a:t>
+            </a:r>
+            <a:endParaRPr lang="bg-BG" dirty="0">
+              <a:solidFill>
+                <a:schemeClr val="accent6"/>
+              </a:solidFill>
+            </a:endParaRPr>
+          </a:p>
+        </p:txBody>
+      </p:sp>
+      <p:pic>
+        <p:nvPicPr>
+          <p:cNvPr id="5" name="Picture 2" descr="http://codingbat.com/doc/string1.png"/>
+          <p:cNvPicPr>
+            <a:picLocks noChangeAspect="1" noChangeArrowheads="1"/>
+          </p:cNvPicPr>
+          <p:nvPr/>
+        </p:nvPicPr>
+        <p:blipFill>
+          <a:blip r:embed="rId2">
+            <a:extLst>
+              <a:ext uri="{28A0092B-C50C-407E-A947-70E740481C1C}">
+                <a14:useLocalDpi xmlns:a14="http://schemas.microsoft.com/office/drawing/2010/main" val="0"/>
+              </a:ext>
+            </a:extLst>
+          </a:blip>
+          <a:srcRect/>
+          <a:stretch>
+            <a:fillRect/>
+          </a:stretch>
+        </p:blipFill>
+        <p:spPr bwMode="auto">
+          <a:xfrm>
+            <a:off x="1905000" y="2819400"/>
+            <a:ext cx="5196017" cy="2034352"/>
+          </a:xfrm>
+          <a:prstGeom prst="rect">
+            <a:avLst/>
+          </a:prstGeom>
+          <a:noFill/>
+          <a:extLst>
+            <a:ext uri="{909E8E84-426E-40DD-AFC4-6F175D3DCCD1}">
+              <a14:hiddenFill xmlns:a14="http://schemas.microsoft.com/office/drawing/2010/main">
+                <a:solidFill>
+                  <a:srgbClr val="FFFFFF"/>
+                </a:solidFill>
+              </a14:hiddenFill>
+            </a:ext>
+          </a:extLst>
+        </p:spPr>
+      </p:pic>
+    </p:spTree>
+    <p:extLst>
+      <p:ext uri="{BB962C8B-B14F-4D97-AF65-F5344CB8AC3E}">
+        <p14:creationId xmlns:p14="http://schemas.microsoft.com/office/powerpoint/2010/main" val="561153055"/>
+      </p:ext>
+    </p:extLst>
+  </p:cSld>
+  <p:clrMapOvr>
+    <a:masterClrMapping/>
+  </p:clrMapOvr>
+  <p:timing>
+    <p:tnLst>
+      <p:par>
+        <p:cTn id="1" dur="indefinite" restart="never" nodeType="tmRoot"/>
+      </p:par>
+    </p:tnLst>
+  </p:timing>
+</p:sld>
+</file>
+
+<file path=ppt/slides/slide13.xml><?xml version="1.0" encoding="utf-8"?>
+<p:sld xmlns:a="http://schemas.openxmlformats.org/drawingml/2006/main" xmlns:r="http://schemas.openxmlformats.org/officeDocument/2006/relationships" xmlns:p="http://schemas.openxmlformats.org/presentationml/2006/main">
+  <p:cSld>
+    <p:spTree>
+      <p:nvGrpSpPr>
+        <p:cNvPr id="1" name=""/>
+        <p:cNvGrpSpPr/>
+        <p:nvPr/>
+      </p:nvGrpSpPr>
+      <p:grpSpPr>
+        <a:xfrm>
+          <a:off x="0" y="0"/>
+          <a:ext cx="0" cy="0"/>
+          <a:chOff x="0" y="0"/>
+          <a:chExt cx="0" cy="0"/>
+        </a:xfrm>
+      </p:grpSpPr>
+      <p:sp>
+        <p:nvSpPr>
+          <p:cNvPr id="2" name="Title 1"/>
+          <p:cNvSpPr>
+            <a:spLocks noGrp="1"/>
+          </p:cNvSpPr>
+          <p:nvPr>
+            <p:ph type="title"/>
+          </p:nvPr>
+        </p:nvSpPr>
+        <p:spPr>
+          <a:xfrm>
             <a:off x="571500" y="685800"/>
             <a:ext cx="8229600" cy="1143000"/>
           </a:xfrm>
@@ -1553,7 +1913,7 @@
 </p:sld>
 </file>
 
-<file path=ppt/slides/slide12.xml><?xml version="1.0" encoding="utf-8"?>
+<file path=ppt/slides/slide14.xml><?xml version="1.0" encoding="utf-8"?>
 <p:sld xmlns:a="http://schemas.openxmlformats.org/drawingml/2006/main" xmlns:r="http://schemas.openxmlformats.org/officeDocument/2006/relationships" xmlns:p="http://schemas.openxmlformats.org/presentationml/2006/main">
   <p:cSld>
     <p:spTree>
@@ -1953,7 +2313,7 @@
 </p:sld>
 </file>
 
-<file path=ppt/slides/slide13.xml><?xml version="1.0" encoding="utf-8"?>
+<file path=ppt/slides/slide15.xml><?xml version="1.0" encoding="utf-8"?>
 <p:sld xmlns:a="http://schemas.openxmlformats.org/drawingml/2006/main" xmlns:r="http://schemas.openxmlformats.org/officeDocument/2006/relationships" xmlns:p="http://schemas.openxmlformats.org/presentationml/2006/main">
   <p:cSld>
     <p:spTree>
@@ -2109,7 +2469,7 @@
 </p:sld>
 </file>
 
-<file path=ppt/slides/slide14.xml><?xml version="1.0" encoding="utf-8"?>
+<file path=ppt/slides/slide16.xml><?xml version="1.0" encoding="utf-8"?>
 <p:sld xmlns:a="http://schemas.openxmlformats.org/drawingml/2006/main" xmlns:r="http://schemas.openxmlformats.org/officeDocument/2006/relationships" xmlns:p="http://schemas.openxmlformats.org/presentationml/2006/main">
   <p:cSld>
     <p:spTree>
@@ -2208,367 +2568,6 @@
     <p:extLst>
       <p:ext uri="{BB962C8B-B14F-4D97-AF65-F5344CB8AC3E}">
         <p14:creationId xmlns:p14="http://schemas.microsoft.com/office/powerpoint/2010/main" val="380702367"/>
-      </p:ext>
-    </p:extLst>
-  </p:cSld>
-  <p:clrMapOvr>
-    <a:masterClrMapping/>
-  </p:clrMapOvr>
-  <p:timing>
-    <p:tnLst>
-      <p:par>
-        <p:cTn id="1" dur="indefinite" restart="never" nodeType="tmRoot"/>
-      </p:par>
-    </p:tnLst>
-  </p:timing>
-</p:sld>
-</file>
-
-<file path=ppt/slides/slide15.xml><?xml version="1.0" encoding="utf-8"?>
-<p:sld xmlns:a="http://schemas.openxmlformats.org/drawingml/2006/main" xmlns:r="http://schemas.openxmlformats.org/officeDocument/2006/relationships" xmlns:p="http://schemas.openxmlformats.org/presentationml/2006/main">
-  <p:cSld>
-    <p:spTree>
-      <p:nvGrpSpPr>
-        <p:cNvPr id="1" name=""/>
-        <p:cNvGrpSpPr/>
-        <p:nvPr/>
-      </p:nvGrpSpPr>
-      <p:grpSpPr>
-        <a:xfrm>
-          <a:off x="0" y="0"/>
-          <a:ext cx="0" cy="0"/>
-          <a:chOff x="0" y="0"/>
-          <a:chExt cx="0" cy="0"/>
-        </a:xfrm>
-      </p:grpSpPr>
-      <p:sp>
-        <p:nvSpPr>
-          <p:cNvPr id="2" name="Title 1"/>
-          <p:cNvSpPr>
-            <a:spLocks noGrp="1"/>
-          </p:cNvSpPr>
-          <p:nvPr>
-            <p:ph type="title"/>
-          </p:nvPr>
-        </p:nvSpPr>
-        <p:spPr>
-          <a:xfrm>
-            <a:off x="609600" y="685800"/>
-            <a:ext cx="8229600" cy="1143000"/>
-          </a:xfrm>
-        </p:spPr>
-        <p:txBody>
-          <a:bodyPr/>
-          <a:lstStyle/>
-          <a:p>
-            <a:r>
-              <a:rPr lang="bg-BG" dirty="0" smtClean="0">
-                <a:solidFill>
-                  <a:schemeClr val="accent6"/>
-                </a:solidFill>
-              </a:rPr>
-              <a:t>Тип </a:t>
-            </a:r>
-            <a:r>
-              <a:rPr lang="en-US" dirty="0" smtClean="0">
-                <a:solidFill>
-                  <a:schemeClr val="accent6"/>
-                </a:solidFill>
-              </a:rPr>
-              <a:t>String</a:t>
-            </a:r>
-            <a:endParaRPr lang="bg-BG" dirty="0">
-              <a:solidFill>
-                <a:schemeClr val="accent6"/>
-              </a:solidFill>
-            </a:endParaRPr>
-          </a:p>
-        </p:txBody>
-      </p:sp>
-      <p:sp>
-        <p:nvSpPr>
-          <p:cNvPr id="3" name="Content Placeholder 2"/>
-          <p:cNvSpPr>
-            <a:spLocks noGrp="1"/>
-          </p:cNvSpPr>
-          <p:nvPr>
-            <p:ph idx="1"/>
-          </p:nvPr>
-        </p:nvSpPr>
-        <p:spPr>
-          <a:xfrm>
-            <a:off x="762000" y="1676400"/>
-            <a:ext cx="7924800" cy="4525963"/>
-          </a:xfrm>
-        </p:spPr>
-        <p:txBody>
-          <a:bodyPr/>
-          <a:lstStyle/>
-          <a:p>
-            <a:pPr>
-              <a:buFont typeface="Wingdings" panose="05000000000000000000" pitchFamily="2" charset="2"/>
-              <a:buChar char="§"/>
-            </a:pPr>
-            <a:r>
-              <a:rPr lang="bg-BG" dirty="0" smtClean="0">
-                <a:solidFill>
-                  <a:schemeClr val="bg1">
-                    <a:lumMod val="95000"/>
-                  </a:schemeClr>
-                </a:solidFill>
-              </a:rPr>
-              <a:t>Референтен тип</a:t>
-            </a:r>
-            <a:endParaRPr lang="en-US" dirty="0" smtClean="0">
-              <a:solidFill>
-                <a:schemeClr val="bg1">
-                  <a:lumMod val="95000"/>
-                </a:schemeClr>
-              </a:solidFill>
-            </a:endParaRPr>
-          </a:p>
-          <a:p>
-            <a:pPr>
-              <a:buFont typeface="Wingdings" panose="05000000000000000000" pitchFamily="2" charset="2"/>
-              <a:buChar char="§"/>
-            </a:pPr>
-            <a:r>
-              <a:rPr lang="bg-BG" dirty="0" smtClean="0">
-                <a:solidFill>
-                  <a:schemeClr val="bg1">
-                    <a:lumMod val="95000"/>
-                  </a:schemeClr>
-                </a:solidFill>
-              </a:rPr>
-              <a:t>Представя поредица от символи (текст)</a:t>
-            </a:r>
-            <a:endParaRPr lang="bg-BG" dirty="0">
-              <a:solidFill>
-                <a:schemeClr val="bg1">
-                  <a:lumMod val="95000"/>
-                </a:schemeClr>
-              </a:solidFill>
-            </a:endParaRPr>
-          </a:p>
-          <a:p>
-            <a:pPr>
-              <a:buFont typeface="Wingdings" panose="05000000000000000000" pitchFamily="2" charset="2"/>
-              <a:buChar char="§"/>
-            </a:pPr>
-            <a:r>
-              <a:rPr lang="bg-BG" dirty="0" smtClean="0">
-                <a:solidFill>
-                  <a:schemeClr val="bg1">
-                    <a:lumMod val="95000"/>
-                  </a:schemeClr>
-                </a:solidFill>
-              </a:rPr>
-              <a:t>Размерът на променливата се определя от броя символи</a:t>
-            </a:r>
-            <a:endParaRPr lang="bg-BG" dirty="0">
-              <a:solidFill>
-                <a:schemeClr val="bg1">
-                  <a:lumMod val="95000"/>
-                </a:schemeClr>
-              </a:solidFill>
-            </a:endParaRPr>
-          </a:p>
-          <a:p>
-            <a:pPr>
-              <a:buFont typeface="Wingdings" panose="05000000000000000000" pitchFamily="2" charset="2"/>
-              <a:buChar char="§"/>
-            </a:pPr>
-            <a:r>
-              <a:rPr lang="en-US" dirty="0" smtClean="0">
-                <a:solidFill>
-                  <a:schemeClr val="bg1">
-                    <a:lumMod val="95000"/>
-                  </a:schemeClr>
-                </a:solidFill>
-              </a:rPr>
-              <a:t>Default null</a:t>
-            </a:r>
-          </a:p>
-          <a:p>
-            <a:pPr>
-              <a:buFont typeface="Wingdings" panose="05000000000000000000" pitchFamily="2" charset="2"/>
-              <a:buChar char="§"/>
-            </a:pPr>
-            <a:r>
-              <a:rPr lang="bg-BG" dirty="0" smtClean="0">
-                <a:solidFill>
-                  <a:schemeClr val="bg1">
-                    <a:lumMod val="95000"/>
-                  </a:schemeClr>
-                </a:solidFill>
-              </a:rPr>
-              <a:t>Низовете (стрингове) могат да се долепят чрез конкатенация</a:t>
-            </a:r>
-            <a:r>
-              <a:rPr lang="en-US" dirty="0" smtClean="0">
-                <a:solidFill>
-                  <a:schemeClr val="bg1">
-                    <a:lumMod val="95000"/>
-                  </a:schemeClr>
-                </a:solidFill>
-              </a:rPr>
-              <a:t> (</a:t>
-            </a:r>
-            <a:r>
-              <a:rPr lang="bg-BG" dirty="0" smtClean="0">
-                <a:solidFill>
-                  <a:schemeClr val="bg1">
-                    <a:lumMod val="95000"/>
-                  </a:schemeClr>
-                </a:solidFill>
-              </a:rPr>
-              <a:t>оператор: +)</a:t>
-            </a:r>
-          </a:p>
-          <a:p>
-            <a:pPr>
-              <a:buFont typeface="Wingdings" panose="05000000000000000000" pitchFamily="2" charset="2"/>
-              <a:buChar char="§"/>
-            </a:pPr>
-            <a:endParaRPr lang="en-US" dirty="0">
-              <a:solidFill>
-                <a:schemeClr val="bg1">
-                  <a:lumMod val="95000"/>
-                </a:schemeClr>
-              </a:solidFill>
-            </a:endParaRPr>
-          </a:p>
-          <a:p>
-            <a:endParaRPr lang="en-US" dirty="0"/>
-          </a:p>
-        </p:txBody>
-      </p:sp>
-    </p:spTree>
-    <p:extLst>
-      <p:ext uri="{BB962C8B-B14F-4D97-AF65-F5344CB8AC3E}">
-        <p14:creationId xmlns:p14="http://schemas.microsoft.com/office/powerpoint/2010/main" val="1328150602"/>
-      </p:ext>
-    </p:extLst>
-  </p:cSld>
-  <p:clrMapOvr>
-    <a:masterClrMapping/>
-  </p:clrMapOvr>
-  <p:timing>
-    <p:tnLst>
-      <p:par>
-        <p:cTn id="1" dur="indefinite" restart="never" nodeType="tmRoot"/>
-      </p:par>
-    </p:tnLst>
-  </p:timing>
-</p:sld>
-</file>
-
-<file path=ppt/slides/slide16.xml><?xml version="1.0" encoding="utf-8"?>
-<p:sld xmlns:a="http://schemas.openxmlformats.org/drawingml/2006/main" xmlns:r="http://schemas.openxmlformats.org/officeDocument/2006/relationships" xmlns:p="http://schemas.openxmlformats.org/presentationml/2006/main">
-  <p:cSld>
-    <p:spTree>
-      <p:nvGrpSpPr>
-        <p:cNvPr id="1" name=""/>
-        <p:cNvGrpSpPr/>
-        <p:nvPr/>
-      </p:nvGrpSpPr>
-      <p:grpSpPr>
-        <a:xfrm>
-          <a:off x="0" y="0"/>
-          <a:ext cx="0" cy="0"/>
-          <a:chOff x="0" y="0"/>
-          <a:chExt cx="0" cy="0"/>
-        </a:xfrm>
-      </p:grpSpPr>
-      <p:sp>
-        <p:nvSpPr>
-          <p:cNvPr id="2" name="Title 1"/>
-          <p:cNvSpPr>
-            <a:spLocks noGrp="1"/>
-          </p:cNvSpPr>
-          <p:nvPr>
-            <p:ph type="title"/>
-          </p:nvPr>
-        </p:nvSpPr>
-        <p:spPr>
-          <a:xfrm>
-            <a:off x="388208" y="685800"/>
-            <a:ext cx="8229600" cy="1143000"/>
-          </a:xfrm>
-        </p:spPr>
-        <p:txBody>
-          <a:bodyPr/>
-          <a:lstStyle/>
-          <a:p>
-            <a:r>
-              <a:rPr lang="bg-BG" dirty="0" smtClean="0">
-                <a:solidFill>
-                  <a:schemeClr val="accent6"/>
-                </a:solidFill>
-              </a:rPr>
-              <a:t>Демонстрация на </a:t>
-            </a:r>
-            <a:r>
-              <a:rPr lang="en-US" dirty="0" smtClean="0">
-                <a:solidFill>
-                  <a:schemeClr val="accent6"/>
-                </a:solidFill>
-              </a:rPr>
-              <a:t>String</a:t>
-            </a:r>
-            <a:endParaRPr lang="bg-BG" dirty="0">
-              <a:solidFill>
-                <a:schemeClr val="accent6"/>
-              </a:solidFill>
-            </a:endParaRPr>
-          </a:p>
-        </p:txBody>
-      </p:sp>
-      <p:pic>
-        <p:nvPicPr>
-          <p:cNvPr id="5" name="Picture 2" descr="http://codingbat.com/doc/string1.png"/>
-          <p:cNvPicPr>
-            <a:picLocks noChangeAspect="1" noChangeArrowheads="1"/>
-          </p:cNvPicPr>
-          <p:nvPr/>
-        </p:nvPicPr>
-        <p:blipFill>
-          <a:blip r:embed="rId2">
-            <a:extLst>
-              <a:ext uri="{28A0092B-C50C-407E-A947-70E740481C1C}">
-                <a14:useLocalDpi xmlns:a14="http://schemas.microsoft.com/office/drawing/2010/main" val="0"/>
-              </a:ext>
-            </a:extLst>
-          </a:blip>
-          <a:srcRect/>
-          <a:stretch>
-            <a:fillRect/>
-          </a:stretch>
-        </p:blipFill>
-        <p:spPr bwMode="auto">
-          <a:xfrm>
-            <a:off x="1905000" y="2819400"/>
-            <a:ext cx="5196017" cy="2034352"/>
-          </a:xfrm>
-          <a:prstGeom prst="rect">
-            <a:avLst/>
-          </a:prstGeom>
-          <a:noFill/>
-          <a:extLst>
-            <a:ext uri="{909E8E84-426E-40DD-AFC4-6F175D3DCCD1}">
-              <a14:hiddenFill xmlns:a14="http://schemas.microsoft.com/office/drawing/2010/main">
-                <a:solidFill>
-                  <a:srgbClr val="FFFFFF"/>
-                </a:solidFill>
-              </a14:hiddenFill>
-            </a:ext>
-          </a:extLst>
-        </p:spPr>
-      </p:pic>
-    </p:spTree>
-    <p:extLst>
-      <p:ext uri="{BB962C8B-B14F-4D97-AF65-F5344CB8AC3E}">
-        <p14:creationId xmlns:p14="http://schemas.microsoft.com/office/powerpoint/2010/main" val="561153055"/>
       </p:ext>
     </p:extLst>
   </p:cSld>
@@ -2825,17 +2824,7 @@
                   </a:schemeClr>
                 </a:solidFill>
               </a:rPr>
-              <a:t>bool(true/false</a:t>
-            </a:r>
-            <a:r>
-              <a:rPr lang="en-US" sz="2800" dirty="0" smtClean="0">
-                <a:solidFill>
-                  <a:schemeClr val="bg1">
-                    <a:lumMod val="95000"/>
-                  </a:schemeClr>
-                </a:solidFill>
-              </a:rPr>
-              <a:t>)</a:t>
+              <a:t>bool(true/false)</a:t>
             </a:r>
             <a:endParaRPr lang="en-US" sz="2800" dirty="0">
               <a:solidFill>
@@ -2988,6 +2977,13 @@
   <p:clrMapOvr>
     <a:masterClrMapping/>
   </p:clrMapOvr>
+  <p:timing>
+    <p:tnLst>
+      <p:par>
+        <p:cTn id="1" dur="indefinite" restart="never" nodeType="tmRoot"/>
+      </p:par>
+    </p:tnLst>
+  </p:timing>
 </p:sld>
 </file>
 
@@ -3029,8 +3025,12 @@
           <a:lstStyle/>
           <a:p>
             <a:r>
-              <a:rPr lang="bg-BG" dirty="0" smtClean="0"/>
-              <a:t>Задача</a:t>
+              <a:rPr lang="bg-BG" dirty="0" smtClean="0">
+                <a:solidFill>
+                  <a:schemeClr val="accent6"/>
+                </a:solidFill>
+              </a:rPr>
+              <a:t>Логически оператори</a:t>
             </a:r>
             <a:endParaRPr lang="bg-BG" dirty="0">
               <a:solidFill>
@@ -3057,22 +3057,238 @@
           </a:xfrm>
         </p:spPr>
         <p:txBody>
-          <a:bodyPr/>
+          <a:bodyPr>
+            <a:normAutofit/>
+          </a:bodyPr>
           <a:lstStyle/>
           <a:p>
-            <a:pPr marL="0" indent="0">
-              <a:buNone/>
-            </a:pPr>
-            <a:r>
-              <a:rPr lang="bg-BG" dirty="0" smtClean="0">
-                <a:solidFill>
-                  <a:schemeClr val="bg1">
-                    <a:lumMod val="95000"/>
-                  </a:schemeClr>
-                </a:solidFill>
-              </a:rPr>
-              <a:t>Напишете програма, която сравнява 2 числа дали са еднакви.</a:t>
-            </a:r>
+            <a:pPr>
+              <a:buFont typeface="Wingdings" panose="05000000000000000000" pitchFamily="2" charset="2"/>
+              <a:buChar char="§"/>
+            </a:pPr>
+            <a:r>
+              <a:rPr lang="bg-BG" sz="2800" dirty="0" smtClean="0">
+                <a:solidFill>
+                  <a:schemeClr val="bg1">
+                    <a:lumMod val="95000"/>
+                  </a:schemeClr>
+                </a:solidFill>
+              </a:rPr>
+              <a:t>Извършват се върху </a:t>
+            </a:r>
+            <a:r>
+              <a:rPr lang="en-US" sz="2800" dirty="0" smtClean="0">
+                <a:solidFill>
+                  <a:schemeClr val="bg1">
+                    <a:lumMod val="95000"/>
+                  </a:schemeClr>
+                </a:solidFill>
+              </a:rPr>
+              <a:t>bool </a:t>
+            </a:r>
+            <a:r>
+              <a:rPr lang="bg-BG" sz="2800" dirty="0" smtClean="0">
+                <a:solidFill>
+                  <a:schemeClr val="bg1">
+                    <a:lumMod val="95000"/>
+                  </a:schemeClr>
+                </a:solidFill>
+              </a:rPr>
+              <a:t>променливи</a:t>
+            </a:r>
+            <a:r>
+              <a:rPr lang="en-US" sz="2800" dirty="0" smtClean="0">
+                <a:solidFill>
+                  <a:schemeClr val="bg1">
+                    <a:lumMod val="95000"/>
+                  </a:schemeClr>
+                </a:solidFill>
+              </a:rPr>
+              <a:t> </a:t>
+            </a:r>
+            <a:r>
+              <a:rPr lang="bg-BG" sz="2800" dirty="0" smtClean="0">
+                <a:solidFill>
+                  <a:schemeClr val="bg1">
+                    <a:lumMod val="95000"/>
+                  </a:schemeClr>
+                </a:solidFill>
+              </a:rPr>
+              <a:t>или изрази за сравнение (защото те връщат </a:t>
+            </a:r>
+            <a:r>
+              <a:rPr lang="en-US" sz="2800" dirty="0" smtClean="0">
+                <a:solidFill>
+                  <a:schemeClr val="bg1">
+                    <a:lumMod val="95000"/>
+                  </a:schemeClr>
+                </a:solidFill>
+              </a:rPr>
+              <a:t>bool)</a:t>
+            </a:r>
+            <a:endParaRPr lang="bg-BG" sz="2800" dirty="0" smtClean="0">
+              <a:solidFill>
+                <a:schemeClr val="bg1">
+                  <a:lumMod val="95000"/>
+                </a:schemeClr>
+              </a:solidFill>
+            </a:endParaRPr>
+          </a:p>
+          <a:p>
+            <a:pPr lvl="1">
+              <a:buFont typeface="Wingdings" panose="05000000000000000000" pitchFamily="2" charset="2"/>
+              <a:buChar char="§"/>
+            </a:pPr>
+            <a:r>
+              <a:rPr lang="en-US" sz="2400" dirty="0" smtClean="0">
+                <a:solidFill>
+                  <a:schemeClr val="bg1">
+                    <a:lumMod val="95000"/>
+                  </a:schemeClr>
+                </a:solidFill>
+              </a:rPr>
+              <a:t>&amp;&amp;</a:t>
+            </a:r>
+            <a:r>
+              <a:rPr lang="bg-BG" sz="2400" dirty="0" smtClean="0">
+                <a:solidFill>
+                  <a:schemeClr val="bg1">
+                    <a:lumMod val="95000"/>
+                  </a:schemeClr>
+                </a:solidFill>
+              </a:rPr>
+              <a:t> - логическо И</a:t>
+            </a:r>
+          </a:p>
+          <a:p>
+            <a:pPr lvl="1">
+              <a:buFont typeface="Wingdings" panose="05000000000000000000" pitchFamily="2" charset="2"/>
+              <a:buChar char="§"/>
+            </a:pPr>
+            <a:r>
+              <a:rPr lang="en-US" sz="2400" dirty="0" smtClean="0">
+                <a:solidFill>
+                  <a:schemeClr val="bg1">
+                    <a:lumMod val="95000"/>
+                  </a:schemeClr>
+                </a:solidFill>
+              </a:rPr>
+              <a:t>||</a:t>
+            </a:r>
+            <a:r>
+              <a:rPr lang="bg-BG" sz="2400" dirty="0" smtClean="0">
+                <a:solidFill>
+                  <a:schemeClr val="bg1">
+                    <a:lumMod val="95000"/>
+                  </a:schemeClr>
+                </a:solidFill>
+              </a:rPr>
+              <a:t> - логическо ИЛИ</a:t>
+            </a:r>
+          </a:p>
+          <a:p>
+            <a:pPr lvl="1">
+              <a:buFont typeface="Wingdings" panose="05000000000000000000" pitchFamily="2" charset="2"/>
+              <a:buChar char="§"/>
+            </a:pPr>
+            <a:r>
+              <a:rPr lang="en-US" sz="2400" dirty="0" smtClean="0">
+                <a:solidFill>
+                  <a:schemeClr val="bg1">
+                    <a:lumMod val="95000"/>
+                  </a:schemeClr>
+                </a:solidFill>
+              </a:rPr>
+              <a:t>^</a:t>
+            </a:r>
+            <a:r>
+              <a:rPr lang="bg-BG" sz="2400" dirty="0" smtClean="0">
+                <a:solidFill>
+                  <a:schemeClr val="bg1">
+                    <a:lumMod val="95000"/>
+                  </a:schemeClr>
+                </a:solidFill>
+              </a:rPr>
+              <a:t> - </a:t>
+            </a:r>
+            <a:r>
+              <a:rPr lang="en-US" sz="2400" dirty="0" smtClean="0">
+                <a:solidFill>
+                  <a:schemeClr val="bg1">
+                    <a:lumMod val="95000"/>
+                  </a:schemeClr>
+                </a:solidFill>
+              </a:rPr>
+              <a:t>XOR</a:t>
+            </a:r>
+            <a:endParaRPr lang="bg-BG" sz="2400" dirty="0" smtClean="0">
+              <a:solidFill>
+                <a:schemeClr val="bg1">
+                  <a:lumMod val="95000"/>
+                </a:schemeClr>
+              </a:solidFill>
+            </a:endParaRPr>
+          </a:p>
+          <a:p>
+            <a:pPr lvl="1">
+              <a:buFont typeface="Wingdings" panose="05000000000000000000" pitchFamily="2" charset="2"/>
+              <a:buChar char="§"/>
+            </a:pPr>
+            <a:r>
+              <a:rPr lang="en-US" sz="2400" dirty="0" smtClean="0">
+                <a:solidFill>
+                  <a:schemeClr val="bg1">
+                    <a:lumMod val="95000"/>
+                  </a:schemeClr>
+                </a:solidFill>
+              </a:rPr>
+              <a:t>! - </a:t>
+            </a:r>
+            <a:r>
+              <a:rPr lang="bg-BG" sz="2400" dirty="0" smtClean="0">
+                <a:solidFill>
+                  <a:schemeClr val="bg1">
+                    <a:lumMod val="95000"/>
+                  </a:schemeClr>
+                </a:solidFill>
+              </a:rPr>
+              <a:t>оператор за отрицание</a:t>
+            </a:r>
+          </a:p>
+          <a:p>
+            <a:pPr>
+              <a:buFont typeface="Wingdings" panose="05000000000000000000" pitchFamily="2" charset="2"/>
+              <a:buChar char="§"/>
+            </a:pPr>
+            <a:r>
+              <a:rPr lang="bg-BG" sz="2800" dirty="0" smtClean="0">
+                <a:solidFill>
+                  <a:schemeClr val="bg1">
+                    <a:lumMod val="95000"/>
+                  </a:schemeClr>
+                </a:solidFill>
+              </a:rPr>
+              <a:t>Приоритет на операторите: !, </a:t>
+            </a:r>
+            <a:r>
+              <a:rPr lang="en-US" sz="2800" dirty="0" smtClean="0">
+                <a:solidFill>
+                  <a:schemeClr val="bg1">
+                    <a:lumMod val="95000"/>
+                  </a:schemeClr>
+                </a:solidFill>
+              </a:rPr>
+              <a:t>^, &amp;&amp;, ||</a:t>
+            </a:r>
+            <a:endParaRPr lang="en-US" sz="2800" dirty="0">
+              <a:solidFill>
+                <a:schemeClr val="bg1">
+                  <a:lumMod val="95000"/>
+                </a:schemeClr>
+              </a:solidFill>
+            </a:endParaRPr>
+          </a:p>
+          <a:p>
             <a:endParaRPr lang="en-US" dirty="0"/>
           </a:p>
         </p:txBody>
@@ -3080,7 +3296,7 @@
     </p:spTree>
     <p:extLst>
       <p:ext uri="{BB962C8B-B14F-4D97-AF65-F5344CB8AC3E}">
-        <p14:creationId xmlns:p14="http://schemas.microsoft.com/office/powerpoint/2010/main" val="2356066109"/>
+        <p14:creationId xmlns:p14="http://schemas.microsoft.com/office/powerpoint/2010/main" val="2736845903"/>
       </p:ext>
     </p:extLst>
   </p:cSld>
@@ -3239,29 +3455,16 @@
             <p:ph type="title"/>
           </p:nvPr>
         </p:nvSpPr>
-        <p:spPr>
-          <a:xfrm>
-            <a:off x="609600" y="685800"/>
-            <a:ext cx="8229600" cy="1143000"/>
-          </a:xfrm>
-        </p:spPr>
+        <p:spPr/>
         <p:txBody>
           <a:bodyPr/>
           <a:lstStyle/>
           <a:p>
             <a:r>
-              <a:rPr lang="bg-BG" dirty="0" smtClean="0">
-                <a:solidFill>
-                  <a:schemeClr val="accent6"/>
-                </a:solidFill>
-              </a:rPr>
-              <a:t>Логически оператори</a:t>
-            </a:r>
-            <a:endParaRPr lang="bg-BG" dirty="0">
-              <a:solidFill>
-                <a:schemeClr val="accent6"/>
-              </a:solidFill>
-            </a:endParaRPr>
+              <a:rPr lang="bg-BG" dirty="0" smtClean="0"/>
+              <a:t>Пример за логически операции</a:t>
+            </a:r>
+            <a:endParaRPr lang="en-US" dirty="0"/>
           </a:p>
         </p:txBody>
       </p:sp>
@@ -3277,251 +3480,66 @@
         </p:nvSpPr>
         <p:spPr>
           <a:xfrm>
-            <a:off x="762000" y="1676400"/>
-            <a:ext cx="7924800" cy="4525963"/>
+            <a:off x="762000" y="2438400"/>
+            <a:ext cx="7848600" cy="3763963"/>
           </a:xfrm>
         </p:spPr>
         <p:txBody>
-          <a:bodyPr>
-            <a:normAutofit/>
-          </a:bodyPr>
+          <a:bodyPr/>
           <a:lstStyle/>
           <a:p>
-            <a:pPr>
-              <a:buFont typeface="Wingdings" panose="05000000000000000000" pitchFamily="2" charset="2"/>
-              <a:buChar char="§"/>
-            </a:pPr>
-            <a:r>
-              <a:rPr lang="bg-BG" sz="2800" dirty="0" smtClean="0">
-                <a:solidFill>
-                  <a:schemeClr val="bg1">
-                    <a:lumMod val="95000"/>
-                  </a:schemeClr>
-                </a:solidFill>
-              </a:rPr>
-              <a:t>Извършват се върху </a:t>
-            </a:r>
-            <a:r>
-              <a:rPr lang="en-US" sz="2800" dirty="0" smtClean="0">
-                <a:solidFill>
-                  <a:schemeClr val="bg1">
-                    <a:lumMod val="95000"/>
-                  </a:schemeClr>
-                </a:solidFill>
-              </a:rPr>
-              <a:t>bool </a:t>
-            </a:r>
-            <a:r>
-              <a:rPr lang="bg-BG" sz="2800" dirty="0" smtClean="0">
-                <a:solidFill>
-                  <a:schemeClr val="bg1">
-                    <a:lumMod val="95000"/>
-                  </a:schemeClr>
-                </a:solidFill>
-              </a:rPr>
-              <a:t>променливи</a:t>
-            </a:r>
-            <a:r>
-              <a:rPr lang="en-US" sz="2800" dirty="0" smtClean="0">
-                <a:solidFill>
-                  <a:schemeClr val="bg1">
-                    <a:lumMod val="95000"/>
-                  </a:schemeClr>
-                </a:solidFill>
-              </a:rPr>
-              <a:t> </a:t>
-            </a:r>
-            <a:r>
-              <a:rPr lang="bg-BG" sz="2800" dirty="0" smtClean="0">
-                <a:solidFill>
-                  <a:schemeClr val="bg1">
-                    <a:lumMod val="95000"/>
-                  </a:schemeClr>
-                </a:solidFill>
-              </a:rPr>
-              <a:t>или изрази за сравнение (защото те връщат </a:t>
-            </a:r>
-            <a:r>
-              <a:rPr lang="en-US" sz="2800" dirty="0" smtClean="0">
-                <a:solidFill>
-                  <a:schemeClr val="bg1">
-                    <a:lumMod val="95000"/>
-                  </a:schemeClr>
-                </a:solidFill>
-              </a:rPr>
-              <a:t>bool)</a:t>
-            </a:r>
-            <a:endParaRPr lang="bg-BG" sz="2800" dirty="0" smtClean="0">
-              <a:solidFill>
-                <a:schemeClr val="bg1">
-                  <a:lumMod val="95000"/>
-                </a:schemeClr>
-              </a:solidFill>
-            </a:endParaRPr>
-          </a:p>
-          <a:p>
-            <a:pPr lvl="1">
-              <a:buFont typeface="Wingdings" panose="05000000000000000000" pitchFamily="2" charset="2"/>
-              <a:buChar char="§"/>
-            </a:pPr>
-            <a:r>
-              <a:rPr lang="en-US" sz="2400" dirty="0" smtClean="0">
-                <a:solidFill>
-                  <a:schemeClr val="bg1">
-                    <a:lumMod val="95000"/>
-                  </a:schemeClr>
-                </a:solidFill>
-              </a:rPr>
-              <a:t>&amp;&amp;</a:t>
-            </a:r>
-            <a:r>
-              <a:rPr lang="bg-BG" sz="2400" dirty="0" smtClean="0">
-                <a:solidFill>
-                  <a:schemeClr val="bg1">
-                    <a:lumMod val="95000"/>
-                  </a:schemeClr>
-                </a:solidFill>
-              </a:rPr>
-              <a:t> - логическо И</a:t>
-            </a:r>
-          </a:p>
-          <a:p>
-            <a:pPr lvl="1">
-              <a:buFont typeface="Wingdings" panose="05000000000000000000" pitchFamily="2" charset="2"/>
-              <a:buChar char="§"/>
-            </a:pPr>
-            <a:r>
-              <a:rPr lang="en-US" sz="2400" dirty="0" smtClean="0">
-                <a:solidFill>
-                  <a:schemeClr val="bg1">
-                    <a:lumMod val="95000"/>
-                  </a:schemeClr>
-                </a:solidFill>
-              </a:rPr>
-              <a:t>||</a:t>
-            </a:r>
-            <a:r>
-              <a:rPr lang="bg-BG" sz="2400" dirty="0" smtClean="0">
-                <a:solidFill>
-                  <a:schemeClr val="bg1">
-                    <a:lumMod val="95000"/>
-                  </a:schemeClr>
-                </a:solidFill>
-              </a:rPr>
-              <a:t> - логическо ИЛИ</a:t>
-            </a:r>
-          </a:p>
-          <a:p>
-            <a:pPr lvl="1">
-              <a:buFont typeface="Wingdings" panose="05000000000000000000" pitchFamily="2" charset="2"/>
-              <a:buChar char="§"/>
-            </a:pPr>
-            <a:r>
-              <a:rPr lang="en-US" sz="2400" dirty="0" smtClean="0">
-                <a:solidFill>
-                  <a:schemeClr val="bg1">
-                    <a:lumMod val="95000"/>
-                  </a:schemeClr>
-                </a:solidFill>
-              </a:rPr>
-              <a:t>^</a:t>
-            </a:r>
-            <a:r>
-              <a:rPr lang="bg-BG" sz="2400" dirty="0" smtClean="0">
-                <a:solidFill>
-                  <a:schemeClr val="bg1">
-                    <a:lumMod val="95000"/>
-                  </a:schemeClr>
-                </a:solidFill>
-              </a:rPr>
-              <a:t> - </a:t>
-            </a:r>
-            <a:r>
-              <a:rPr lang="en-US" sz="2400" dirty="0" smtClean="0">
-                <a:solidFill>
-                  <a:schemeClr val="bg1">
-                    <a:lumMod val="95000"/>
-                  </a:schemeClr>
-                </a:solidFill>
-              </a:rPr>
-              <a:t>XOR</a:t>
-            </a:r>
-            <a:endParaRPr lang="bg-BG" sz="2400" dirty="0" smtClean="0">
-              <a:solidFill>
-                <a:schemeClr val="bg1">
-                  <a:lumMod val="95000"/>
-                </a:schemeClr>
-              </a:solidFill>
-            </a:endParaRPr>
-          </a:p>
-          <a:p>
-            <a:pPr lvl="1">
-              <a:buFont typeface="Wingdings" panose="05000000000000000000" pitchFamily="2" charset="2"/>
-              <a:buChar char="§"/>
-            </a:pPr>
-            <a:r>
-              <a:rPr lang="en-US" sz="2400" dirty="0" smtClean="0">
-                <a:solidFill>
-                  <a:schemeClr val="bg1">
-                    <a:lumMod val="95000"/>
-                  </a:schemeClr>
-                </a:solidFill>
-              </a:rPr>
-              <a:t>! - </a:t>
-            </a:r>
-            <a:r>
-              <a:rPr lang="bg-BG" sz="2400" dirty="0" smtClean="0">
-                <a:solidFill>
-                  <a:schemeClr val="bg1">
-                    <a:lumMod val="95000"/>
-                  </a:schemeClr>
-                </a:solidFill>
-              </a:rPr>
-              <a:t>оператор за отрицание</a:t>
-            </a:r>
-          </a:p>
-          <a:p>
-            <a:pPr>
-              <a:buFont typeface="Wingdings" panose="05000000000000000000" pitchFamily="2" charset="2"/>
-              <a:buChar char="§"/>
-            </a:pPr>
-            <a:r>
-              <a:rPr lang="bg-BG" sz="2800" dirty="0" smtClean="0">
-                <a:solidFill>
-                  <a:schemeClr val="bg1">
-                    <a:lumMod val="95000"/>
-                  </a:schemeClr>
-                </a:solidFill>
-              </a:rPr>
-              <a:t>Приоритет на операторите: !, </a:t>
-            </a:r>
-            <a:r>
-              <a:rPr lang="en-US" sz="2800" dirty="0" smtClean="0">
-                <a:solidFill>
-                  <a:schemeClr val="bg1">
-                    <a:lumMod val="95000"/>
-                  </a:schemeClr>
-                </a:solidFill>
-              </a:rPr>
-              <a:t>^, &amp;&amp;, ||</a:t>
-            </a:r>
-            <a:endParaRPr lang="en-US" sz="2800" dirty="0">
-              <a:solidFill>
-                <a:schemeClr val="bg1">
-                  <a:lumMod val="95000"/>
-                </a:schemeClr>
-              </a:solidFill>
-            </a:endParaRPr>
+            <a:endParaRPr lang="bg-BG" dirty="0" smtClean="0"/>
           </a:p>
           <a:p>
             <a:endParaRPr lang="en-US" dirty="0"/>
           </a:p>
         </p:txBody>
       </p:sp>
+      <p:pic>
+        <p:nvPicPr>
+          <p:cNvPr id="5" name="Picture 2" descr="http://www.java-samples.com/images/java.h4.gif"/>
+          <p:cNvPicPr>
+            <a:picLocks noChangeAspect="1" noChangeArrowheads="1"/>
+          </p:cNvPicPr>
+          <p:nvPr/>
+        </p:nvPicPr>
+        <p:blipFill>
+          <a:blip r:embed="rId2">
+            <a:extLst>
+              <a:ext uri="{28A0092B-C50C-407E-A947-70E740481C1C}">
+                <a14:useLocalDpi xmlns:a14="http://schemas.microsoft.com/office/drawing/2010/main" val="0"/>
+              </a:ext>
+            </a:extLst>
+          </a:blip>
+          <a:srcRect/>
+          <a:stretch>
+            <a:fillRect/>
+          </a:stretch>
+        </p:blipFill>
+        <p:spPr bwMode="auto">
+          <a:xfrm>
+            <a:off x="1371600" y="2481912"/>
+            <a:ext cx="6332839" cy="2547288"/>
+          </a:xfrm>
+          <a:prstGeom prst="rect">
+            <a:avLst/>
+          </a:prstGeom>
+          <a:noFill/>
+          <a:extLst>
+            <a:ext uri="{909E8E84-426E-40DD-AFC4-6F175D3DCCD1}">
+              <a14:hiddenFill xmlns:a14="http://schemas.microsoft.com/office/drawing/2010/main">
+                <a:solidFill>
+                  <a:srgbClr val="FFFFFF"/>
+                </a:solidFill>
+              </a14:hiddenFill>
+            </a:ext>
+          </a:extLst>
+        </p:spPr>
+      </p:pic>
     </p:spTree>
     <p:extLst>
       <p:ext uri="{BB962C8B-B14F-4D97-AF65-F5344CB8AC3E}">
-        <p14:creationId xmlns:p14="http://schemas.microsoft.com/office/powerpoint/2010/main" val="2736845903"/>
+        <p14:creationId xmlns:p14="http://schemas.microsoft.com/office/powerpoint/2010/main" val="2308107820"/>
       </p:ext>
     </p:extLst>
   </p:cSld>
@@ -3565,16 +3583,30 @@
             <p:ph type="title"/>
           </p:nvPr>
         </p:nvSpPr>
-        <p:spPr/>
+        <p:spPr>
+          <a:xfrm>
+            <a:off x="838200" y="685800"/>
+            <a:ext cx="8229600" cy="1143000"/>
+          </a:xfrm>
+        </p:spPr>
         <p:txBody>
           <a:bodyPr/>
           <a:lstStyle/>
           <a:p>
-            <a:r>
-              <a:rPr lang="bg-BG" dirty="0" smtClean="0"/>
-              <a:t>Пример за логически операции</a:t>
-            </a:r>
-            <a:endParaRPr lang="en-US" dirty="0"/>
+            <a:pPr algn="l"/>
+            <a:r>
+              <a:rPr lang="bg-BG" dirty="0" smtClean="0">
+                <a:solidFill>
+                  <a:schemeClr val="accent6"/>
+                </a:solidFill>
+              </a:rPr>
+              <a:t>Въпроси</a:t>
+            </a:r>
+            <a:endParaRPr lang="bg-BG" dirty="0">
+              <a:solidFill>
+                <a:schemeClr val="accent6"/>
+              </a:solidFill>
+            </a:endParaRPr>
           </a:p>
         </p:txBody>
       </p:sp>
@@ -3590,31 +3622,79 @@
         </p:nvSpPr>
         <p:spPr>
           <a:xfrm>
-            <a:off x="762000" y="2438400"/>
-            <a:ext cx="7848600" cy="3763963"/>
+            <a:off x="762000" y="1676400"/>
+            <a:ext cx="7620000" cy="4525963"/>
           </a:xfrm>
         </p:spPr>
         <p:txBody>
-          <a:bodyPr/>
+          <a:bodyPr>
+            <a:normAutofit/>
+          </a:bodyPr>
           <a:lstStyle/>
           <a:p>
-            <a:endParaRPr lang="bg-BG" dirty="0" smtClean="0"/>
-          </a:p>
-          <a:p>
-            <a:endParaRPr lang="en-US" dirty="0"/>
+            <a:pPr>
+              <a:buFont typeface="Wingdings" panose="05000000000000000000" pitchFamily="2" charset="2"/>
+              <a:buChar char="§"/>
+            </a:pPr>
+            <a:endParaRPr lang="en-US" dirty="0">
+              <a:solidFill>
+                <a:schemeClr val="bg1">
+                  <a:lumMod val="95000"/>
+                </a:schemeClr>
+              </a:solidFill>
+            </a:endParaRPr>
+          </a:p>
+          <a:p>
+            <a:pPr>
+              <a:buFont typeface="Wingdings" panose="05000000000000000000" pitchFamily="2" charset="2"/>
+              <a:buChar char="§"/>
+            </a:pPr>
+            <a:endParaRPr lang="en-US" dirty="0">
+              <a:solidFill>
+                <a:schemeClr val="bg1">
+                  <a:lumMod val="95000"/>
+                </a:schemeClr>
+              </a:solidFill>
+            </a:endParaRPr>
+          </a:p>
+          <a:p>
+            <a:pPr>
+              <a:buFont typeface="Wingdings" panose="05000000000000000000" pitchFamily="2" charset="2"/>
+              <a:buChar char="§"/>
+            </a:pPr>
+            <a:endParaRPr lang="en-US" dirty="0">
+              <a:solidFill>
+                <a:schemeClr val="bg1">
+                  <a:lumMod val="95000"/>
+                </a:schemeClr>
+              </a:solidFill>
+            </a:endParaRPr>
+          </a:p>
+          <a:p>
+            <a:pPr>
+              <a:buFont typeface="Wingdings" panose="05000000000000000000" pitchFamily="2" charset="2"/>
+              <a:buChar char="§"/>
+            </a:pPr>
+            <a:endParaRPr lang="en-US" dirty="0">
+              <a:solidFill>
+                <a:schemeClr val="bg1">
+                  <a:lumMod val="95000"/>
+                </a:schemeClr>
+              </a:solidFill>
+            </a:endParaRPr>
           </a:p>
         </p:txBody>
       </p:sp>
       <p:pic>
         <p:nvPicPr>
-          <p:cNvPr id="5" name="Picture 2" descr="http://www.java-samples.com/images/java.h4.gif"/>
+          <p:cNvPr id="1027" name="Picture 3" descr="C:\Users\Lazar\Desktop\01-red-question-mark1.jpg"/>
           <p:cNvPicPr>
             <a:picLocks noChangeAspect="1" noChangeArrowheads="1"/>
           </p:cNvPicPr>
           <p:nvPr/>
         </p:nvPicPr>
         <p:blipFill>
-          <a:blip r:embed="rId2">
+          <a:blip r:embed="rId2" cstate="print">
             <a:extLst>
               <a:ext uri="{28A0092B-C50C-407E-A947-70E740481C1C}">
                 <a14:useLocalDpi xmlns:a14="http://schemas.microsoft.com/office/drawing/2010/main" val="0"/>
@@ -3628,8 +3708,8 @@
         </p:blipFill>
         <p:spPr bwMode="auto">
           <a:xfrm>
-            <a:off x="1371600" y="2481912"/>
-            <a:ext cx="6332839" cy="2547288"/>
+            <a:off x="3505200" y="2057400"/>
+            <a:ext cx="2419082" cy="2419082"/>
           </a:xfrm>
           <a:prstGeom prst="rect">
             <a:avLst/>
@@ -3649,13 +3729,20 @@
     </p:spTree>
     <p:extLst>
       <p:ext uri="{BB962C8B-B14F-4D97-AF65-F5344CB8AC3E}">
-        <p14:creationId xmlns:p14="http://schemas.microsoft.com/office/powerpoint/2010/main" val="2308107820"/>
+        <p14:creationId xmlns:p14="http://schemas.microsoft.com/office/powerpoint/2010/main" val="3297631730"/>
       </p:ext>
     </p:extLst>
   </p:cSld>
   <p:clrMapOvr>
     <a:masterClrMapping/>
   </p:clrMapOvr>
+  <p:timing>
+    <p:tnLst>
+      <p:par>
+        <p:cTn id="1" dur="indefinite" restart="never" nodeType="tmRoot"/>
+      </p:par>
+    </p:tnLst>
+  </p:timing>
 </p:sld>
 </file>
 
@@ -3703,196 +3790,6 @@
                   <a:schemeClr val="accent6"/>
                 </a:solidFill>
               </a:rPr>
-              <a:t>Въпроси</a:t>
-            </a:r>
-            <a:endParaRPr lang="bg-BG" dirty="0">
-              <a:solidFill>
-                <a:schemeClr val="accent6"/>
-              </a:solidFill>
-            </a:endParaRPr>
-          </a:p>
-        </p:txBody>
-      </p:sp>
-      <p:sp>
-        <p:nvSpPr>
-          <p:cNvPr id="3" name="Content Placeholder 2"/>
-          <p:cNvSpPr>
-            <a:spLocks noGrp="1"/>
-          </p:cNvSpPr>
-          <p:nvPr>
-            <p:ph idx="1"/>
-          </p:nvPr>
-        </p:nvSpPr>
-        <p:spPr>
-          <a:xfrm>
-            <a:off x="762000" y="1676400"/>
-            <a:ext cx="7620000" cy="4525963"/>
-          </a:xfrm>
-        </p:spPr>
-        <p:txBody>
-          <a:bodyPr>
-            <a:normAutofit/>
-          </a:bodyPr>
-          <a:lstStyle/>
-          <a:p>
-            <a:pPr>
-              <a:buFont typeface="Wingdings" panose="05000000000000000000" pitchFamily="2" charset="2"/>
-              <a:buChar char="§"/>
-            </a:pPr>
-            <a:endParaRPr lang="en-US" dirty="0">
-              <a:solidFill>
-                <a:schemeClr val="bg1">
-                  <a:lumMod val="95000"/>
-                </a:schemeClr>
-              </a:solidFill>
-            </a:endParaRPr>
-          </a:p>
-          <a:p>
-            <a:pPr>
-              <a:buFont typeface="Wingdings" panose="05000000000000000000" pitchFamily="2" charset="2"/>
-              <a:buChar char="§"/>
-            </a:pPr>
-            <a:endParaRPr lang="en-US" dirty="0">
-              <a:solidFill>
-                <a:schemeClr val="bg1">
-                  <a:lumMod val="95000"/>
-                </a:schemeClr>
-              </a:solidFill>
-            </a:endParaRPr>
-          </a:p>
-          <a:p>
-            <a:pPr>
-              <a:buFont typeface="Wingdings" panose="05000000000000000000" pitchFamily="2" charset="2"/>
-              <a:buChar char="§"/>
-            </a:pPr>
-            <a:endParaRPr lang="en-US" dirty="0">
-              <a:solidFill>
-                <a:schemeClr val="bg1">
-                  <a:lumMod val="95000"/>
-                </a:schemeClr>
-              </a:solidFill>
-            </a:endParaRPr>
-          </a:p>
-          <a:p>
-            <a:pPr>
-              <a:buFont typeface="Wingdings" panose="05000000000000000000" pitchFamily="2" charset="2"/>
-              <a:buChar char="§"/>
-            </a:pPr>
-            <a:endParaRPr lang="en-US" dirty="0">
-              <a:solidFill>
-                <a:schemeClr val="bg1">
-                  <a:lumMod val="95000"/>
-                </a:schemeClr>
-              </a:solidFill>
-            </a:endParaRPr>
-          </a:p>
-        </p:txBody>
-      </p:sp>
-      <p:pic>
-        <p:nvPicPr>
-          <p:cNvPr id="1027" name="Picture 3" descr="C:\Users\Lazar\Desktop\01-red-question-mark1.jpg"/>
-          <p:cNvPicPr>
-            <a:picLocks noChangeAspect="1" noChangeArrowheads="1"/>
-          </p:cNvPicPr>
-          <p:nvPr/>
-        </p:nvPicPr>
-        <p:blipFill>
-          <a:blip r:embed="rId2" cstate="print">
-            <a:extLst>
-              <a:ext uri="{28A0092B-C50C-407E-A947-70E740481C1C}">
-                <a14:useLocalDpi xmlns:a14="http://schemas.microsoft.com/office/drawing/2010/main" val="0"/>
-              </a:ext>
-            </a:extLst>
-          </a:blip>
-          <a:srcRect/>
-          <a:stretch>
-            <a:fillRect/>
-          </a:stretch>
-        </p:blipFill>
-        <p:spPr bwMode="auto">
-          <a:xfrm>
-            <a:off x="3505200" y="2057400"/>
-            <a:ext cx="2419082" cy="2419082"/>
-          </a:xfrm>
-          <a:prstGeom prst="rect">
-            <a:avLst/>
-          </a:prstGeom>
-          <a:noFill/>
-          <a:extLst>
-            <a:ext uri="{909E8E84-426E-40DD-AFC4-6F175D3DCCD1}">
-              <a14:hiddenFill xmlns:a14="http://schemas.microsoft.com/office/drawing/2010/main">
-                <a:solidFill>
-                  <a:srgbClr val="FFFFFF"/>
-                </a:solidFill>
-              </a14:hiddenFill>
-            </a:ext>
-          </a:extLst>
-        </p:spPr>
-      </p:pic>
-    </p:spTree>
-    <p:extLst>
-      <p:ext uri="{BB962C8B-B14F-4D97-AF65-F5344CB8AC3E}">
-        <p14:creationId xmlns:p14="http://schemas.microsoft.com/office/powerpoint/2010/main" val="3297631730"/>
-      </p:ext>
-    </p:extLst>
-  </p:cSld>
-  <p:clrMapOvr>
-    <a:masterClrMapping/>
-  </p:clrMapOvr>
-  <p:timing>
-    <p:tnLst>
-      <p:par>
-        <p:cTn id="1" dur="indefinite" restart="never" nodeType="tmRoot"/>
-      </p:par>
-    </p:tnLst>
-  </p:timing>
-</p:sld>
-</file>
-
-<file path=ppt/slides/slide23.xml><?xml version="1.0" encoding="utf-8"?>
-<p:sld xmlns:a="http://schemas.openxmlformats.org/drawingml/2006/main" xmlns:r="http://schemas.openxmlformats.org/officeDocument/2006/relationships" xmlns:p="http://schemas.openxmlformats.org/presentationml/2006/main">
-  <p:cSld>
-    <p:spTree>
-      <p:nvGrpSpPr>
-        <p:cNvPr id="1" name=""/>
-        <p:cNvGrpSpPr/>
-        <p:nvPr/>
-      </p:nvGrpSpPr>
-      <p:grpSpPr>
-        <a:xfrm>
-          <a:off x="0" y="0"/>
-          <a:ext cx="0" cy="0"/>
-          <a:chOff x="0" y="0"/>
-          <a:chExt cx="0" cy="0"/>
-        </a:xfrm>
-      </p:grpSpPr>
-      <p:sp>
-        <p:nvSpPr>
-          <p:cNvPr id="2" name="Title 1"/>
-          <p:cNvSpPr>
-            <a:spLocks noGrp="1"/>
-          </p:cNvSpPr>
-          <p:nvPr>
-            <p:ph type="title"/>
-          </p:nvPr>
-        </p:nvSpPr>
-        <p:spPr>
-          <a:xfrm>
-            <a:off x="838200" y="685800"/>
-            <a:ext cx="8229600" cy="1143000"/>
-          </a:xfrm>
-        </p:spPr>
-        <p:txBody>
-          <a:bodyPr/>
-          <a:lstStyle/>
-          <a:p>
-            <a:pPr algn="l"/>
-            <a:r>
-              <a:rPr lang="bg-BG" dirty="0" smtClean="0">
-                <a:solidFill>
-                  <a:schemeClr val="accent6"/>
-                </a:solidFill>
-              </a:rPr>
               <a:t>Задачи за домашна работа</a:t>
             </a:r>
             <a:endParaRPr lang="bg-BG" dirty="0">
@@ -4216,7 +4113,7 @@
 </p:sld>
 </file>
 
-<file path=ppt/slides/slide24.xml><?xml version="1.0" encoding="utf-8"?>
+<file path=ppt/slides/slide23.xml><?xml version="1.0" encoding="utf-8"?>
 <p:sld xmlns:a="http://schemas.openxmlformats.org/drawingml/2006/main" xmlns:r="http://schemas.openxmlformats.org/officeDocument/2006/relationships" xmlns:p="http://schemas.openxmlformats.org/presentationml/2006/main">
   <p:cSld>
     <p:spTree>
@@ -4908,17 +4805,7 @@
                   </a:schemeClr>
                 </a:solidFill>
               </a:rPr>
-              <a:t>default: 0, </a:t>
-            </a:r>
-            <a:r>
-              <a:rPr lang="en-US" sz="2200" dirty="0" smtClean="0">
-                <a:solidFill>
-                  <a:schemeClr val="bg1">
-                    <a:lumMod val="95000"/>
-                  </a:schemeClr>
-                </a:solidFill>
-              </a:rPr>
-              <a:t>[0, +255]</a:t>
+              <a:t>default: 0, [0, +255]</a:t>
             </a:r>
             <a:endParaRPr lang="bg-BG" sz="2200" dirty="0">
               <a:solidFill>
@@ -5416,17 +5303,7 @@
                   </a:schemeClr>
                 </a:solidFill>
               </a:rPr>
-              <a:t>0.0d, [-1.7E+308, +1.7E+308</a:t>
-            </a:r>
-            <a:r>
-              <a:rPr lang="en-US" sz="2200" dirty="0" smtClean="0">
-                <a:solidFill>
-                  <a:schemeClr val="bg1">
-                    <a:lumMod val="95000"/>
-                  </a:schemeClr>
-                </a:solidFill>
-              </a:rPr>
-              <a:t>]</a:t>
+              <a:t>0.0d, [-1.7E+308, +1.7E+308]</a:t>
             </a:r>
           </a:p>
           <a:p>
@@ -5555,17 +5432,7 @@
                   </a:schemeClr>
                 </a:solidFill>
               </a:rPr>
-              <a:t> </a:t>
-            </a:r>
-            <a:r>
-              <a:rPr lang="en-US" sz="2200" dirty="0" smtClean="0">
-                <a:solidFill>
-                  <a:schemeClr val="bg1">
-                    <a:lumMod val="95000"/>
-                  </a:schemeClr>
-                </a:solidFill>
-              </a:rPr>
-              <a:t>– </a:t>
+              <a:t> – </a:t>
             </a:r>
             <a:r>
               <a:rPr lang="bg-BG" sz="2200" dirty="0">
@@ -5711,27 +5578,7 @@
                   </a:schemeClr>
                 </a:solidFill>
               </a:rPr>
-              <a:t>‘\0</a:t>
-            </a:r>
-            <a:r>
-              <a:rPr lang="en-US" sz="2200" dirty="0" smtClean="0">
-                <a:solidFill>
-                  <a:schemeClr val="bg1">
-                    <a:lumMod val="95000"/>
-                  </a:schemeClr>
-                </a:solidFill>
-              </a:rPr>
-              <a:t>’, [0, +65535</a:t>
-            </a:r>
-            <a:r>
-              <a:rPr lang="en-US" sz="2200" dirty="0" smtClean="0">
-                <a:solidFill>
-                  <a:schemeClr val="bg1">
-                    <a:lumMod val="95000"/>
-                  </a:schemeClr>
-                </a:solidFill>
-              </a:rPr>
-              <a:t>]</a:t>
+              <a:t>‘\0’, [0, +65535]</a:t>
             </a:r>
             <a:endParaRPr lang="bg-BG" sz="2200" dirty="0">
               <a:solidFill>
@@ -5999,13 +5846,6 @@
               </a:rPr>
               <a:t>decimal</a:t>
             </a:r>
-            <a:endParaRPr lang="en-US" b="1" dirty="0" smtClean="0">
-              <a:solidFill>
-                <a:schemeClr val="bg1">
-                  <a:lumMod val="95000"/>
-                </a:schemeClr>
-              </a:solidFill>
-            </a:endParaRPr>
           </a:p>
           <a:p>
             <a:pPr>

</xml_diff>